<commit_message>
changed images for readme
</commit_message>
<xml_diff>
--- a/graphics.pptx
+++ b/graphics.pptx
@@ -6,7 +6,7 @@
     <p:sldMasterId id="2147483663" r:id="rId2"/>
   </p:sldMasterIdLst>
   <p:notesMasterIdLst>
-    <p:notesMasterId r:id="rId20"/>
+    <p:notesMasterId r:id="rId21"/>
   </p:notesMasterIdLst>
   <p:sldIdLst>
     <p:sldId id="256" r:id="rId3"/>
@@ -25,7 +25,8 @@
     <p:sldId id="275" r:id="rId16"/>
     <p:sldId id="276" r:id="rId17"/>
     <p:sldId id="277" r:id="rId18"/>
-    <p:sldId id="266" r:id="rId19"/>
+    <p:sldId id="279" r:id="rId19"/>
+    <p:sldId id="266" r:id="rId20"/>
   </p:sldIdLst>
   <p:sldSz cx="8640763" cy="6480175"/>
   <p:notesSz cx="6858000" cy="9144000"/>
@@ -399,7 +400,7 @@
               <a:pPr>
                 <a:defRPr/>
               </a:pPr>
-              <a:t>03.02.2023</a:t>
+              <a:t>02.03.2023</a:t>
             </a:fld>
             <a:endParaRPr lang="de-DE" altLang="de-DE"/>
           </a:p>
@@ -1071,7 +1072,7 @@
               <a:pPr>
                 <a:defRPr/>
               </a:pPr>
-              <a:t>03.02.2023</a:t>
+              <a:t>02.03.2023</a:t>
             </a:fld>
             <a:endParaRPr lang="de-DE" altLang="de-DE"/>
           </a:p>
@@ -4128,7 +4129,7 @@
             <a:fld id="{0E787D1E-3F06-46AF-A683-FBF877765792}" type="datetime1">
               <a:rPr lang="de-DE" altLang="de-DE" sz="2200"/>
               <a:pPr eaLnBrk="1" hangingPunct="1"/>
-              <a:t>03.02.2023</a:t>
+              <a:t>02.03.2023</a:t>
             </a:fld>
             <a:endParaRPr lang="de-DE" altLang="de-DE" sz="2200"/>
           </a:p>
@@ -6277,6 +6278,66 @@
 </file>
 
 <file path=ppt/slides/slide17.xml><?xml version="1.0" encoding="utf-8"?>
+<p:sld xmlns:a="http://schemas.openxmlformats.org/drawingml/2006/main" xmlns:r="http://schemas.openxmlformats.org/officeDocument/2006/relationships" xmlns:p="http://schemas.openxmlformats.org/presentationml/2006/main">
+  <p:cSld>
+    <p:spTree>
+      <p:nvGrpSpPr>
+        <p:cNvPr id="1" name=""/>
+        <p:cNvGrpSpPr/>
+        <p:nvPr/>
+      </p:nvGrpSpPr>
+      <p:grpSpPr>
+        <a:xfrm>
+          <a:off x="0" y="0"/>
+          <a:ext cx="0" cy="0"/>
+          <a:chOff x="0" y="0"/>
+          <a:chExt cx="0" cy="0"/>
+        </a:xfrm>
+      </p:grpSpPr>
+      <p:pic>
+        <p:nvPicPr>
+          <p:cNvPr id="41" name="Grafik 40">
+            <a:extLst>
+              <a:ext uri="{FF2B5EF4-FFF2-40B4-BE49-F238E27FC236}">
+                <a16:creationId xmlns:a16="http://schemas.microsoft.com/office/drawing/2014/main" id="{72ED72B3-F587-A35C-AA86-72B346B25159}"/>
+              </a:ext>
+            </a:extLst>
+          </p:cNvPr>
+          <p:cNvPicPr>
+            <a:picLocks noChangeAspect="1"/>
+          </p:cNvPicPr>
+          <p:nvPr/>
+        </p:nvPicPr>
+        <p:blipFill>
+          <a:blip r:embed="rId2"/>
+          <a:stretch>
+            <a:fillRect/>
+          </a:stretch>
+        </p:blipFill>
+        <p:spPr>
+          <a:xfrm>
+            <a:off x="71195" y="1958474"/>
+            <a:ext cx="8498372" cy="2563226"/>
+          </a:xfrm>
+          <a:prstGeom prst="rect">
+            <a:avLst/>
+          </a:prstGeom>
+        </p:spPr>
+      </p:pic>
+    </p:spTree>
+    <p:extLst>
+      <p:ext uri="{BB962C8B-B14F-4D97-AF65-F5344CB8AC3E}">
+        <p14:creationId xmlns:p14="http://schemas.microsoft.com/office/powerpoint/2010/main" val="1806497301"/>
+      </p:ext>
+    </p:extLst>
+  </p:cSld>
+  <p:clrMapOvr>
+    <a:masterClrMapping/>
+  </p:clrMapOvr>
+</p:sld>
+</file>
+
+<file path=ppt/slides/slide18.xml><?xml version="1.0" encoding="utf-8"?>
 <p:sld xmlns:a="http://schemas.openxmlformats.org/drawingml/2006/main" xmlns:r="http://schemas.openxmlformats.org/officeDocument/2006/relationships" xmlns:p="http://schemas.openxmlformats.org/presentationml/2006/main">
   <p:cSld>
     <p:spTree>

</xml_diff>

<commit_message>
add setup for report
</commit_message>
<xml_diff>
--- a/graphics.pptx
+++ b/graphics.pptx
@@ -400,7 +400,7 @@
               <a:pPr>
                 <a:defRPr/>
               </a:pPr>
-              <a:t>02.03.2023</a:t>
+              <a:t>06.03.2023</a:t>
             </a:fld>
             <a:endParaRPr lang="de-DE" altLang="de-DE"/>
           </a:p>
@@ -1072,7 +1072,7 @@
               <a:pPr>
                 <a:defRPr/>
               </a:pPr>
-              <a:t>02.03.2023</a:t>
+              <a:t>06.03.2023</a:t>
             </a:fld>
             <a:endParaRPr lang="de-DE" altLang="de-DE"/>
           </a:p>
@@ -4129,7 +4129,7 @@
             <a:fld id="{0E787D1E-3F06-46AF-A683-FBF877765792}" type="datetime1">
               <a:rPr lang="de-DE" altLang="de-DE" sz="2200"/>
               <a:pPr eaLnBrk="1" hangingPunct="1"/>
-              <a:t>02.03.2023</a:t>
+              <a:t>06.03.2023</a:t>
             </a:fld>
             <a:endParaRPr lang="de-DE" altLang="de-DE" sz="2200"/>
           </a:p>
@@ -6296,10 +6296,10 @@
       </p:grpSpPr>
       <p:pic>
         <p:nvPicPr>
-          <p:cNvPr id="41" name="Grafik 40">
-            <a:extLst>
-              <a:ext uri="{FF2B5EF4-FFF2-40B4-BE49-F238E27FC236}">
-                <a16:creationId xmlns:a16="http://schemas.microsoft.com/office/drawing/2014/main" id="{72ED72B3-F587-A35C-AA86-72B346B25159}"/>
+          <p:cNvPr id="2" name="Grafik 1">
+            <a:extLst>
+              <a:ext uri="{FF2B5EF4-FFF2-40B4-BE49-F238E27FC236}">
+                <a16:creationId xmlns:a16="http://schemas.microsoft.com/office/drawing/2014/main" id="{812109F1-EECA-BEC3-FA14-38ABAC2A4A09}"/>
               </a:ext>
             </a:extLst>
           </p:cNvPr>
@@ -12937,7 +12937,7 @@
                 </a:solidFill>
                 <a:latin typeface="Baskerville Old Face" panose="02020602080505020303" pitchFamily="18" charset="0"/>
               </a:rPr>
-              <a:t>Occurences</a:t>
+              <a:t>Occurrences</a:t>
             </a:r>
             <a:r>
               <a:rPr lang="de-DE" dirty="0">
@@ -13193,7 +13193,7 @@
           </a:solidFill>
           <a:ln>
             <a:solidFill>
-              <a:srgbClr val="36060A"/>
+              <a:srgbClr val="040936"/>
             </a:solidFill>
           </a:ln>
         </p:spPr>

</xml_diff>